<commit_message>
fixing slides to include quizzes
</commit_message>
<xml_diff>
--- a/ClassMaterials/CollisionHandling/Slides/Part1-DesignInheritance.pptx
+++ b/ClassMaterials/CollisionHandling/Slides/Part1-DesignInheritance.pptx
@@ -186,13 +186,13 @@
 <pc:chgInfo xmlns:a="http://schemas.openxmlformats.org/drawingml/2006/main" xmlns:r="http://schemas.openxmlformats.org/officeDocument/2006/relationships" xmlns:ac="http://schemas.microsoft.com/office/drawing/2013/main/command" xmlns:pc="http://schemas.microsoft.com/office/powerpoint/2013/main/command">
   <pc:docChgLst>
     <pc:chgData name="Yoder, Jason" userId="28f4d4d8-da04-4f86-b14d-a21675737bc5" providerId="ADAL" clId="{2F770440-08CB-40D9-83AA-5471C138D830}"/>
-    <pc:docChg chg="modSld">
-      <pc:chgData name="Yoder, Jason" userId="28f4d4d8-da04-4f86-b14d-a21675737bc5" providerId="ADAL" clId="{2F770440-08CB-40D9-83AA-5471C138D830}" dt="2023-11-20T21:29:06.861" v="9" actId="20577"/>
+    <pc:docChg chg="custSel modSld">
+      <pc:chgData name="Yoder, Jason" userId="28f4d4d8-da04-4f86-b14d-a21675737bc5" providerId="ADAL" clId="{2F770440-08CB-40D9-83AA-5471C138D830}" dt="2023-11-21T17:29:18.136" v="78" actId="6549"/>
       <pc:docMkLst>
         <pc:docMk/>
       </pc:docMkLst>
       <pc:sldChg chg="modSp mod">
-        <pc:chgData name="Yoder, Jason" userId="28f4d4d8-da04-4f86-b14d-a21675737bc5" providerId="ADAL" clId="{2F770440-08CB-40D9-83AA-5471C138D830}" dt="2023-11-20T21:29:06.861" v="9" actId="20577"/>
+        <pc:chgData name="Yoder, Jason" userId="28f4d4d8-da04-4f86-b14d-a21675737bc5" providerId="ADAL" clId="{2F770440-08CB-40D9-83AA-5471C138D830}" dt="2023-11-21T17:29:18.136" v="78" actId="6549"/>
         <pc:sldMkLst>
           <pc:docMk/>
           <pc:sldMk cId="3262595057" sldId="311"/>
@@ -203,6 +203,14 @@
             <pc:docMk/>
             <pc:sldMk cId="3262595057" sldId="311"/>
             <ac:spMk id="3" creationId="{25DE3A95-9095-C9FA-B463-89F721FD6037}"/>
+          </ac:spMkLst>
+        </pc:spChg>
+        <pc:spChg chg="mod">
+          <ac:chgData name="Yoder, Jason" userId="28f4d4d8-da04-4f86-b14d-a21675737bc5" providerId="ADAL" clId="{2F770440-08CB-40D9-83AA-5471C138D830}" dt="2023-11-21T17:29:18.136" v="78" actId="6549"/>
+          <ac:spMkLst>
+            <pc:docMk/>
+            <pc:sldMk cId="3262595057" sldId="311"/>
+            <ac:spMk id="5" creationId="{74C661F2-B2E9-CC4D-AC4C-572A07C30C6F}"/>
           </ac:spMkLst>
         </pc:spChg>
       </pc:sldChg>
@@ -415,7 +423,7 @@
             <a:fld id="{68AFFCC9-E980-4A2E-8F84-91052C1F2C22}" type="datetime1">
               <a:rPr lang="en-US"/>
               <a:pPr/>
-              <a:t>11/20/2023</a:t>
+              <a:t>11/21/2023</a:t>
             </a:fld>
             <a:endParaRPr lang="en-US"/>
           </a:p>
@@ -644,7 +652,7 @@
             <a:fld id="{C4411CED-79EF-4046-B79B-F8927B54B6B0}" type="datetime1">
               <a:rPr lang="en-US"/>
               <a:pPr/>
-              <a:t>11/20/2023</a:t>
+              <a:t>11/21/2023</a:t>
             </a:fld>
             <a:endParaRPr lang="en-US"/>
           </a:p>
@@ -2278,7 +2286,7 @@
             <a:fld id="{43E6E5DC-7A70-4CAB-B8CA-FD7CFBA6DDCF}" type="datetime1">
               <a:rPr lang="en-US" smtClean="0"/>
               <a:pPr/>
-              <a:t>11/20/2023</a:t>
+              <a:t>11/21/2023</a:t>
             </a:fld>
             <a:endParaRPr lang="en-US"/>
           </a:p>
@@ -2451,7 +2459,7 @@
             <a:fld id="{34C58A64-F6CF-4D4F-A14E-4E9A6689521C}" type="datetime1">
               <a:rPr lang="en-US" smtClean="0"/>
               <a:pPr/>
-              <a:t>11/20/2023</a:t>
+              <a:t>11/21/2023</a:t>
             </a:fld>
             <a:endParaRPr lang="en-US"/>
           </a:p>
@@ -2634,7 +2642,7 @@
             <a:fld id="{28A961FD-7946-4EF3-8B09-2E96C5099CE1}" type="datetime1">
               <a:rPr lang="en-US" smtClean="0"/>
               <a:pPr/>
-              <a:t>11/20/2023</a:t>
+              <a:t>11/21/2023</a:t>
             </a:fld>
             <a:endParaRPr lang="en-US"/>
           </a:p>
@@ -2807,7 +2815,7 @@
             <a:fld id="{410E03A8-3A50-4824-93B1-5AB2817A85E6}" type="datetime1">
               <a:rPr lang="en-US" smtClean="0"/>
               <a:pPr/>
-              <a:t>11/20/2023</a:t>
+              <a:t>11/21/2023</a:t>
             </a:fld>
             <a:endParaRPr lang="en-US"/>
           </a:p>
@@ -3057,7 +3065,7 @@
             <a:fld id="{69EE78C3-2E3E-4EDD-A8FC-A11FEA9CDF04}" type="datetime1">
               <a:rPr lang="en-US" smtClean="0"/>
               <a:pPr/>
-              <a:t>11/20/2023</a:t>
+              <a:t>11/21/2023</a:t>
             </a:fld>
             <a:endParaRPr lang="en-US"/>
           </a:p>
@@ -3347,7 +3355,7 @@
             <a:fld id="{9CAD6738-AE48-490E-BA60-16B31C3E5798}" type="datetime1">
               <a:rPr lang="en-US" smtClean="0"/>
               <a:pPr/>
-              <a:t>11/20/2023</a:t>
+              <a:t>11/21/2023</a:t>
             </a:fld>
             <a:endParaRPr lang="en-US"/>
           </a:p>
@@ -3771,7 +3779,7 @@
             <a:fld id="{12137309-80BC-4890-B91A-AB9885E172E5}" type="datetime1">
               <a:rPr lang="en-US" smtClean="0"/>
               <a:pPr/>
-              <a:t>11/20/2023</a:t>
+              <a:t>11/21/2023</a:t>
             </a:fld>
             <a:endParaRPr lang="en-US"/>
           </a:p>
@@ -3893,7 +3901,7 @@
             <a:fld id="{79C16A63-0F78-4E9D-81E4-A84E1F25A0A3}" type="datetime1">
               <a:rPr lang="en-US" smtClean="0"/>
               <a:pPr/>
-              <a:t>11/20/2023</a:t>
+              <a:t>11/21/2023</a:t>
             </a:fld>
             <a:endParaRPr lang="en-US"/>
           </a:p>
@@ -3993,7 +4001,7 @@
             <a:fld id="{DC5FF9E9-979C-4422-A1BB-1DC64426F0DA}" type="datetime1">
               <a:rPr lang="en-US" smtClean="0"/>
               <a:pPr/>
-              <a:t>11/20/2023</a:t>
+              <a:t>11/21/2023</a:t>
             </a:fld>
             <a:endParaRPr lang="en-US"/>
           </a:p>
@@ -4273,7 +4281,7 @@
             <a:fld id="{B9B7020D-910B-4676-A902-AD52382F28B6}" type="datetime1">
               <a:rPr lang="en-US" smtClean="0"/>
               <a:pPr/>
-              <a:t>11/20/2023</a:t>
+              <a:t>11/21/2023</a:t>
             </a:fld>
             <a:endParaRPr lang="en-US"/>
           </a:p>
@@ -4530,7 +4538,7 @@
             <a:fld id="{4695FF79-924D-47D6-A727-6A03000C0C91}" type="datetime1">
               <a:rPr lang="en-US" smtClean="0"/>
               <a:pPr/>
-              <a:t>11/20/2023</a:t>
+              <a:t>11/21/2023</a:t>
             </a:fld>
             <a:endParaRPr lang="en-US"/>
           </a:p>
@@ -4746,7 +4754,7 @@
             <a:fld id="{A51E304D-C692-4D58-A925-D35D66927263}" type="datetime1">
               <a:rPr lang="en-US" smtClean="0"/>
               <a:pPr/>
-              <a:t>11/20/2023</a:t>
+              <a:t>11/21/2023</a:t>
             </a:fld>
             <a:endParaRPr lang="en-US"/>
           </a:p>
@@ -5221,8 +5229,8 @@
         </p:nvSpPr>
         <p:spPr>
           <a:xfrm>
-            <a:off x="304800" y="5105400"/>
-            <a:ext cx="8534400" cy="1295400"/>
+            <a:off x="304800" y="4652385"/>
+            <a:ext cx="8534400" cy="1923039"/>
           </a:xfrm>
           <a:prstGeom prst="rect">
             <a:avLst/>
@@ -5295,6 +5303,55 @@
             <a:r>
               <a:rPr lang="en-US" sz="2400" i="1" dirty="0" err="1"/>
               <a:t>PracticeSolutionInheritanceDesign</a:t>
+            </a:r>
+            <a:endParaRPr lang="en-US" sz="2400" i="1" dirty="0"/>
+          </a:p>
+          <a:p>
+            <a:r>
+              <a:rPr lang="en-US" sz="2400" dirty="0">
+                <a:solidFill>
+                  <a:srgbClr val="FFFFFF"/>
+                </a:solidFill>
+              </a:rPr>
+              <a:t>The </a:t>
+            </a:r>
+            <a:r>
+              <a:rPr lang="en-US" sz="2400" i="1" dirty="0">
+                <a:solidFill>
+                  <a:srgbClr val="FFFFFF"/>
+                </a:solidFill>
+              </a:rPr>
+              <a:t>Quiz</a:t>
+            </a:r>
+            <a:r>
+              <a:rPr lang="en-US" sz="2400" dirty="0">
+                <a:solidFill>
+                  <a:srgbClr val="FFFFFF"/>
+                </a:solidFill>
+              </a:rPr>
+              <a:t> for today is:</a:t>
+            </a:r>
+          </a:p>
+          <a:p>
+            <a:pPr marL="342900" indent="-342900">
+              <a:buFont typeface="Arial" panose="020B0604020202020204" pitchFamily="34" charset="0"/>
+              <a:buChar char="•"/>
+            </a:pPr>
+            <a:r>
+              <a:rPr lang="en-US" sz="2400" i="1" dirty="0" err="1"/>
+              <a:t>CollisionHandling</a:t>
+            </a:r>
+            <a:r>
+              <a:rPr lang="en-US" sz="2400" i="1" dirty="0"/>
+              <a:t>(</a:t>
+            </a:r>
+            <a:r>
+              <a:rPr lang="en-US" sz="2400" i="1" dirty="0" err="1"/>
+              <a:t>DesignInheritance</a:t>
+            </a:r>
+            <a:r>
+              <a:rPr lang="en-US" sz="2400" i="1"/>
+              <a:t>)Quiz</a:t>
             </a:r>
             <a:endParaRPr lang="en-US" sz="2400" i="1" dirty="0"/>
           </a:p>

</xml_diff>